<commit_message>
Add Notest to PPTX
</commit_message>
<xml_diff>
--- a/bernhackt_team_material/aldente_präsentation_bernmobil.pptx
+++ b/bernhackt_team_material/aldente_präsentation_bernmobil.pptx
@@ -489,7 +489,35 @@
           <a:bodyPr/>
           <a:lstStyle/>
           <a:p>
-            <a:endParaRPr lang="de-DE" dirty="0"/>
+            <a:pPr marL="0" marR="0" lvl="0" indent="0" algn="l" defTabSz="914400" rtl="0" eaLnBrk="1" fontAlgn="auto" latinLnBrk="0" hangingPunct="1">
+              <a:lnSpc>
+                <a:spcPct val="100000"/>
+              </a:lnSpc>
+              <a:spcBef>
+                <a:spcPts val="0"/>
+              </a:spcBef>
+              <a:spcAft>
+                <a:spcPts val="0"/>
+              </a:spcAft>
+              <a:buClrTx/>
+              <a:buSzTx/>
+              <a:buFontTx/>
+              <a:buNone/>
+              <a:tabLst/>
+              <a:defRPr/>
+            </a:pPr>
+            <a:r>
+              <a:rPr lang="de-CH" sz="1200" kern="1200" dirty="0">
+                <a:solidFill>
+                  <a:schemeClr val="tx1"/>
+                </a:solidFill>
+                <a:effectLst/>
+                <a:latin typeface="+mn-lt"/>
+                <a:ea typeface="+mn-ea"/>
+                <a:cs typeface="+mn-cs"/>
+              </a:rPr>
+              <a:t>Jeder kennt Flugmeilen. Jetzt kommen die Tram-Meilen! </a:t>
+            </a:r>
           </a:p>
         </p:txBody>
       </p:sp>
@@ -510,7 +538,7 @@
           <a:p>
             <a:fld id="{9C43F178-B2D3-214E-B2AB-22C5D90FDEFE}" type="slidenum">
               <a:rPr lang="de-DE" smtClean="0"/>
-              <a:t>5</a:t>
+              <a:t>2</a:t>
             </a:fld>
             <a:endParaRPr lang="de-DE"/>
           </a:p>
@@ -519,7 +547,7 @@
     </p:spTree>
     <p:extLst>
       <p:ext uri="{BB962C8B-B14F-4D97-AF65-F5344CB8AC3E}">
-        <p14:creationId xmlns:p14="http://schemas.microsoft.com/office/powerpoint/2010/main" val="2918893096"/>
+        <p14:creationId xmlns:p14="http://schemas.microsoft.com/office/powerpoint/2010/main" val="4215305896"/>
       </p:ext>
     </p:extLst>
   </p:cSld>
@@ -573,7 +601,390 @@
           <a:bodyPr/>
           <a:lstStyle/>
           <a:p>
+            <a:r>
+              <a:rPr lang="de-CH" sz="1200" kern="1200" dirty="0">
+                <a:solidFill>
+                  <a:schemeClr val="tx1"/>
+                </a:solidFill>
+                <a:effectLst/>
+                <a:latin typeface="+mn-lt"/>
+                <a:ea typeface="+mn-ea"/>
+                <a:cs typeface="+mn-cs"/>
+              </a:rPr>
+              <a:t>Mit der neuen App von Bernmobil kannst du unterwegs in der Stadt Punkte sammeln, mit Reise-</a:t>
+            </a:r>
+            <a:r>
+              <a:rPr lang="de-CH" sz="1200" kern="1200" dirty="0" err="1">
+                <a:solidFill>
+                  <a:schemeClr val="tx1"/>
+                </a:solidFill>
+                <a:effectLst/>
+                <a:latin typeface="+mn-lt"/>
+                <a:ea typeface="+mn-ea"/>
+                <a:cs typeface="+mn-cs"/>
+              </a:rPr>
+              <a:t>Challenges</a:t>
+            </a:r>
+            <a:r>
+              <a:rPr lang="de-CH" sz="1200" kern="1200" dirty="0">
+                <a:solidFill>
+                  <a:schemeClr val="tx1"/>
+                </a:solidFill>
+                <a:effectLst/>
+                <a:latin typeface="+mn-lt"/>
+                <a:ea typeface="+mn-ea"/>
+                <a:cs typeface="+mn-cs"/>
+              </a:rPr>
+              <a:t> besondere Preise gewinnen, dein Level steigern und dich gegen deine Freunde messen! </a:t>
+            </a:r>
+          </a:p>
+          <a:p>
+            <a:r>
+              <a:rPr lang="de-CH" sz="1200" kern="1200" dirty="0">
+                <a:solidFill>
+                  <a:schemeClr val="tx1"/>
+                </a:solidFill>
+                <a:effectLst/>
+                <a:latin typeface="+mn-lt"/>
+                <a:ea typeface="+mn-ea"/>
+                <a:cs typeface="+mn-cs"/>
+              </a:rPr>
+              <a:t>Deine gesammelten Punkte kannst du gegen verschiedene Vorteile, wie zum Beispiel Mitfahr-Tageskarten oder Rabatte mit Partnerunternehmen eintauschen.</a:t>
+            </a:r>
+          </a:p>
+        </p:txBody>
+      </p:sp>
+      <p:sp>
+        <p:nvSpPr>
+          <p:cNvPr id="4" name="Foliennummernplatzhalter 3"/>
+          <p:cNvSpPr>
+            <a:spLocks noGrp="1"/>
+          </p:cNvSpPr>
+          <p:nvPr>
+            <p:ph type="sldNum" sz="quarter" idx="5"/>
+          </p:nvPr>
+        </p:nvSpPr>
+        <p:spPr/>
+        <p:txBody>
+          <a:bodyPr/>
+          <a:lstStyle/>
+          <a:p>
+            <a:fld id="{9C43F178-B2D3-214E-B2AB-22C5D90FDEFE}" type="slidenum">
+              <a:rPr lang="de-DE" smtClean="0"/>
+              <a:t>3</a:t>
+            </a:fld>
+            <a:endParaRPr lang="de-DE"/>
+          </a:p>
+        </p:txBody>
+      </p:sp>
+    </p:spTree>
+    <p:extLst>
+      <p:ext uri="{BB962C8B-B14F-4D97-AF65-F5344CB8AC3E}">
+        <p14:creationId xmlns:p14="http://schemas.microsoft.com/office/powerpoint/2010/main" val="2134190130"/>
+      </p:ext>
+    </p:extLst>
+  </p:cSld>
+  <p:clrMapOvr>
+    <a:masterClrMapping/>
+  </p:clrMapOvr>
+</p:notes>
+</file>
+
+<file path=ppt/notesSlides/notesSlide3.xml><?xml version="1.0" encoding="utf-8"?>
+<p:notes xmlns:a="http://schemas.openxmlformats.org/drawingml/2006/main" xmlns:r="http://schemas.openxmlformats.org/officeDocument/2006/relationships" xmlns:p="http://schemas.openxmlformats.org/presentationml/2006/main">
+  <p:cSld>
+    <p:spTree>
+      <p:nvGrpSpPr>
+        <p:cNvPr id="1" name=""/>
+        <p:cNvGrpSpPr/>
+        <p:nvPr/>
+      </p:nvGrpSpPr>
+      <p:grpSpPr>
+        <a:xfrm>
+          <a:off x="0" y="0"/>
+          <a:ext cx="0" cy="0"/>
+          <a:chOff x="0" y="0"/>
+          <a:chExt cx="0" cy="0"/>
+        </a:xfrm>
+      </p:grpSpPr>
+      <p:sp>
+        <p:nvSpPr>
+          <p:cNvPr id="2" name="Folienbildplatzhalter 1"/>
+          <p:cNvSpPr>
+            <a:spLocks noGrp="1" noRot="1" noChangeAspect="1"/>
+          </p:cNvSpPr>
+          <p:nvPr>
+            <p:ph type="sldImg"/>
+          </p:nvPr>
+        </p:nvSpPr>
+        <p:spPr/>
+      </p:sp>
+      <p:sp>
+        <p:nvSpPr>
+          <p:cNvPr id="3" name="Notizenplatzhalter 2"/>
+          <p:cNvSpPr>
+            <a:spLocks noGrp="1"/>
+          </p:cNvSpPr>
+          <p:nvPr>
+            <p:ph type="body" idx="1"/>
+          </p:nvPr>
+        </p:nvSpPr>
+        <p:spPr/>
+        <p:txBody>
+          <a:bodyPr/>
+          <a:lstStyle/>
+          <a:p>
             <a:endParaRPr lang="de-DE" dirty="0"/>
+          </a:p>
+        </p:txBody>
+      </p:sp>
+      <p:sp>
+        <p:nvSpPr>
+          <p:cNvPr id="4" name="Foliennummernplatzhalter 3"/>
+          <p:cNvSpPr>
+            <a:spLocks noGrp="1"/>
+          </p:cNvSpPr>
+          <p:nvPr>
+            <p:ph type="sldNum" sz="quarter" idx="5"/>
+          </p:nvPr>
+        </p:nvSpPr>
+        <p:spPr/>
+        <p:txBody>
+          <a:bodyPr/>
+          <a:lstStyle/>
+          <a:p>
+            <a:fld id="{9C43F178-B2D3-214E-B2AB-22C5D90FDEFE}" type="slidenum">
+              <a:rPr lang="de-DE" smtClean="0"/>
+              <a:t>4</a:t>
+            </a:fld>
+            <a:endParaRPr lang="de-DE"/>
+          </a:p>
+        </p:txBody>
+      </p:sp>
+    </p:spTree>
+    <p:extLst>
+      <p:ext uri="{BB962C8B-B14F-4D97-AF65-F5344CB8AC3E}">
+        <p14:creationId xmlns:p14="http://schemas.microsoft.com/office/powerpoint/2010/main" val="1262670119"/>
+      </p:ext>
+    </p:extLst>
+  </p:cSld>
+  <p:clrMapOvr>
+    <a:masterClrMapping/>
+  </p:clrMapOvr>
+</p:notes>
+</file>
+
+<file path=ppt/notesSlides/notesSlide4.xml><?xml version="1.0" encoding="utf-8"?>
+<p:notes xmlns:a="http://schemas.openxmlformats.org/drawingml/2006/main" xmlns:r="http://schemas.openxmlformats.org/officeDocument/2006/relationships" xmlns:p="http://schemas.openxmlformats.org/presentationml/2006/main">
+  <p:cSld>
+    <p:spTree>
+      <p:nvGrpSpPr>
+        <p:cNvPr id="1" name=""/>
+        <p:cNvGrpSpPr/>
+        <p:nvPr/>
+      </p:nvGrpSpPr>
+      <p:grpSpPr>
+        <a:xfrm>
+          <a:off x="0" y="0"/>
+          <a:ext cx="0" cy="0"/>
+          <a:chOff x="0" y="0"/>
+          <a:chExt cx="0" cy="0"/>
+        </a:xfrm>
+      </p:grpSpPr>
+      <p:sp>
+        <p:nvSpPr>
+          <p:cNvPr id="2" name="Folienbildplatzhalter 1"/>
+          <p:cNvSpPr>
+            <a:spLocks noGrp="1" noRot="1" noChangeAspect="1"/>
+          </p:cNvSpPr>
+          <p:nvPr>
+            <p:ph type="sldImg"/>
+          </p:nvPr>
+        </p:nvSpPr>
+        <p:spPr/>
+      </p:sp>
+      <p:sp>
+        <p:nvSpPr>
+          <p:cNvPr id="3" name="Notizenplatzhalter 2"/>
+          <p:cNvSpPr>
+            <a:spLocks noGrp="1"/>
+          </p:cNvSpPr>
+          <p:nvPr>
+            <p:ph type="body" idx="1"/>
+          </p:nvPr>
+        </p:nvSpPr>
+        <p:spPr/>
+        <p:txBody>
+          <a:bodyPr/>
+          <a:lstStyle/>
+          <a:p>
+            <a:r>
+              <a:rPr lang="de-DE" dirty="0"/>
+              <a:t>Was sind die Vorteile von so einer Plattform für BERNMOBIL?</a:t>
+            </a:r>
+          </a:p>
+          <a:p>
+            <a:endParaRPr lang="de-DE" dirty="0"/>
+          </a:p>
+          <a:p>
+            <a:pPr marL="228600" indent="-228600">
+              <a:buAutoNum type="arabicPeriod"/>
+            </a:pPr>
+            <a:r>
+              <a:rPr lang="de-DE" dirty="0"/>
+              <a:t>Durch einen neuen interaktiven Marketingkanal mit hohem Engagement können BERNMOBIL ihre Kunden direkt ansprechen und anspornen, ihre Dienste zu verwenden.</a:t>
+            </a:r>
+          </a:p>
+          <a:p>
+            <a:pPr marL="228600" indent="-228600">
+              <a:buAutoNum type="arabicPeriod"/>
+            </a:pPr>
+            <a:r>
+              <a:rPr lang="de-DE" dirty="0"/>
+              <a:t>Da Reiseberichte granular pro Benutzer mit Demographie-, Reisezeit- und weiteren Informationen aufgezeichnet werden, kann BERNMOBIL genauer nachvollziehen, wie ihre Kunden in Bern unterwegs sind.</a:t>
+            </a:r>
+          </a:p>
+          <a:p>
+            <a:pPr marL="228600" indent="-228600">
+              <a:buAutoNum type="arabicPeriod"/>
+            </a:pPr>
+            <a:r>
+              <a:rPr lang="de-DE" dirty="0"/>
+              <a:t>Die </a:t>
+            </a:r>
+            <a:r>
+              <a:rPr lang="de-DE" dirty="0" err="1"/>
+              <a:t>Challenges</a:t>
+            </a:r>
+            <a:r>
+              <a:rPr lang="de-DE" dirty="0"/>
+              <a:t> und das Punktesystem bieten die Möglichkeit zur Einbindung von gesponserten Angeboten, was eine Gelegenheit für neue Partnerschaften bietet.</a:t>
+            </a:r>
+          </a:p>
+        </p:txBody>
+      </p:sp>
+      <p:sp>
+        <p:nvSpPr>
+          <p:cNvPr id="4" name="Foliennummernplatzhalter 3"/>
+          <p:cNvSpPr>
+            <a:spLocks noGrp="1"/>
+          </p:cNvSpPr>
+          <p:nvPr>
+            <p:ph type="sldNum" sz="quarter" idx="5"/>
+          </p:nvPr>
+        </p:nvSpPr>
+        <p:spPr/>
+        <p:txBody>
+          <a:bodyPr/>
+          <a:lstStyle/>
+          <a:p>
+            <a:fld id="{9C43F178-B2D3-214E-B2AB-22C5D90FDEFE}" type="slidenum">
+              <a:rPr lang="de-DE" smtClean="0"/>
+              <a:t>5</a:t>
+            </a:fld>
+            <a:endParaRPr lang="de-DE"/>
+          </a:p>
+        </p:txBody>
+      </p:sp>
+    </p:spTree>
+    <p:extLst>
+      <p:ext uri="{BB962C8B-B14F-4D97-AF65-F5344CB8AC3E}">
+        <p14:creationId xmlns:p14="http://schemas.microsoft.com/office/powerpoint/2010/main" val="2918893096"/>
+      </p:ext>
+    </p:extLst>
+  </p:cSld>
+  <p:clrMapOvr>
+    <a:masterClrMapping/>
+  </p:clrMapOvr>
+</p:notes>
+</file>
+
+<file path=ppt/notesSlides/notesSlide5.xml><?xml version="1.0" encoding="utf-8"?>
+<p:notes xmlns:a="http://schemas.openxmlformats.org/drawingml/2006/main" xmlns:r="http://schemas.openxmlformats.org/officeDocument/2006/relationships" xmlns:p="http://schemas.openxmlformats.org/presentationml/2006/main">
+  <p:cSld>
+    <p:spTree>
+      <p:nvGrpSpPr>
+        <p:cNvPr id="1" name=""/>
+        <p:cNvGrpSpPr/>
+        <p:nvPr/>
+      </p:nvGrpSpPr>
+      <p:grpSpPr>
+        <a:xfrm>
+          <a:off x="0" y="0"/>
+          <a:ext cx="0" cy="0"/>
+          <a:chOff x="0" y="0"/>
+          <a:chExt cx="0" cy="0"/>
+        </a:xfrm>
+      </p:grpSpPr>
+      <p:sp>
+        <p:nvSpPr>
+          <p:cNvPr id="2" name="Folienbildplatzhalter 1"/>
+          <p:cNvSpPr>
+            <a:spLocks noGrp="1" noRot="1" noChangeAspect="1"/>
+          </p:cNvSpPr>
+          <p:nvPr>
+            <p:ph type="sldImg"/>
+          </p:nvPr>
+        </p:nvSpPr>
+        <p:spPr/>
+      </p:sp>
+      <p:sp>
+        <p:nvSpPr>
+          <p:cNvPr id="3" name="Notizenplatzhalter 2"/>
+          <p:cNvSpPr>
+            <a:spLocks noGrp="1"/>
+          </p:cNvSpPr>
+          <p:nvPr>
+            <p:ph type="body" idx="1"/>
+          </p:nvPr>
+        </p:nvSpPr>
+        <p:spPr/>
+        <p:txBody>
+          <a:bodyPr/>
+          <a:lstStyle/>
+          <a:p>
+            <a:r>
+              <a:rPr lang="de-DE" dirty="0"/>
+              <a:t>Was sind die Vorteile für den Benutzer?</a:t>
+            </a:r>
+          </a:p>
+          <a:p>
+            <a:endParaRPr lang="de-DE" dirty="0"/>
+          </a:p>
+          <a:p>
+            <a:pPr marL="228600" indent="-228600">
+              <a:buAutoNum type="arabicPeriod"/>
+            </a:pPr>
+            <a:r>
+              <a:rPr lang="de-DE" dirty="0"/>
+              <a:t>Durch das Sammeln von Punkten können Treueprämien und weitere Aktionen erzielt werden.</a:t>
+            </a:r>
+          </a:p>
+          <a:p>
+            <a:pPr marL="228600" indent="-228600">
+              <a:buAutoNum type="arabicPeriod"/>
+            </a:pPr>
+            <a:r>
+              <a:rPr lang="de-DE" dirty="0"/>
+              <a:t>Die Gameification der Reise mit dem ÖV bietet einen neuen Unterhaltungswert im Verkehr, wo man oft warten muss.</a:t>
+            </a:r>
+          </a:p>
+          <a:p>
+            <a:pPr marL="228600" indent="-228600">
+              <a:buAutoNum type="arabicPeriod"/>
+            </a:pPr>
+            <a:r>
+              <a:rPr lang="de-DE" dirty="0"/>
+              <a:t>Ein möglicher </a:t>
+            </a:r>
+            <a:r>
+              <a:rPr lang="de-DE" dirty="0" err="1"/>
+              <a:t>Social</a:t>
+            </a:r>
+            <a:r>
+              <a:rPr lang="de-DE" dirty="0"/>
+              <a:t>-Aspekt der App ermöglicht Konkurrenzwettbewerbe zwischen Freunden.</a:t>
+            </a:r>
           </a:p>
         </p:txBody>
       </p:sp>
@@ -3710,7 +4121,7 @@
           <p:nvPr/>
         </p:nvPicPr>
         <p:blipFill>
-          <a:blip r:embed="rId2"/>
+          <a:blip r:embed="rId3"/>
           <a:stretch>
             <a:fillRect/>
           </a:stretch>

</xml_diff>